<commit_message>
chore(cycle): align screenshots with 3.1.0
related to #CAM-5628
</commit_message>
<xml_diff>
--- a/develop/drawings/cycle.pptx
+++ b/develop/drawings/cycle.pptx
@@ -6,6 +6,16 @@
   </p:sldMasterIdLst>
   <p:sldIdLst>
     <p:sldId id="256" r:id="rId2"/>
+    <p:sldId id="263" r:id="rId3"/>
+    <p:sldId id="267" r:id="rId4"/>
+    <p:sldId id="266" r:id="rId5"/>
+    <p:sldId id="265" r:id="rId6"/>
+    <p:sldId id="258" r:id="rId7"/>
+    <p:sldId id="259" r:id="rId8"/>
+    <p:sldId id="260" r:id="rId9"/>
+    <p:sldId id="261" r:id="rId10"/>
+    <p:sldId id="262" r:id="rId11"/>
+    <p:sldId id="264" r:id="rId12"/>
   </p:sldIdLst>
   <p:sldSz cx="12192000" cy="6858000"/>
   <p:notesSz cx="6858000" cy="9144000"/>
@@ -104,6 +114,11 @@
       </a:defRPr>
     </a:lvl9pPr>
   </p:defaultTextStyle>
+  <p:extLst>
+    <p:ext uri="{EFAFB233-063F-42B5-8137-9DF3F51BA10A}">
+      <p15:sldGuideLst xmlns:p15="http://schemas.microsoft.com/office/powerpoint/2012/main"/>
+    </p:ext>
+  </p:extLst>
 </p:presentation>
 </file>
 
@@ -149,10 +164,9 @@
           </a:lstStyle>
           <a:p>
             <a:r>
-              <a:rPr lang="de-DE" smtClean="0"/>
+              <a:rPr lang="de-DE"/>
               <a:t>Titelmasterformat durch Klicken bearbeiten</a:t>
             </a:r>
-            <a:endParaRPr lang="de-DE"/>
           </a:p>
         </p:txBody>
       </p:sp>
@@ -214,10 +228,9 @@
           </a:lstStyle>
           <a:p>
             <a:r>
-              <a:rPr lang="de-DE" smtClean="0"/>
+              <a:rPr lang="de-DE"/>
               <a:t>Formatvorlage des Untertitelmasters durch Klicken bearbeiten</a:t>
             </a:r>
-            <a:endParaRPr lang="de-DE"/>
           </a:p>
         </p:txBody>
       </p:sp>
@@ -238,7 +251,7 @@
           <a:p>
             <a:fld id="{E6E54620-55E2-47CA-B387-7FC75089EF22}" type="datetimeFigureOut">
               <a:rPr lang="de-DE" smtClean="0"/>
-              <a:t>23.10.2015</a:t>
+              <a:t>16.03.2016</a:t>
             </a:fld>
             <a:endParaRPr lang="de-DE"/>
           </a:p>
@@ -332,10 +345,9 @@
           <a:lstStyle/>
           <a:p>
             <a:r>
-              <a:rPr lang="de-DE" smtClean="0"/>
+              <a:rPr lang="de-DE"/>
               <a:t>Titelmasterformat durch Klicken bearbeiten</a:t>
             </a:r>
-            <a:endParaRPr lang="de-DE"/>
           </a:p>
         </p:txBody>
       </p:sp>
@@ -356,38 +368,37 @@
           <a:p>
             <a:pPr lvl="0"/>
             <a:r>
-              <a:rPr lang="de-DE" smtClean="0"/>
+              <a:rPr lang="de-DE"/>
               <a:t>Textmasterformat bearbeiten</a:t>
             </a:r>
           </a:p>
           <a:p>
             <a:pPr lvl="1"/>
             <a:r>
-              <a:rPr lang="de-DE" smtClean="0"/>
+              <a:rPr lang="de-DE"/>
               <a:t>Zweite Ebene</a:t>
             </a:r>
           </a:p>
           <a:p>
             <a:pPr lvl="2"/>
             <a:r>
-              <a:rPr lang="de-DE" smtClean="0"/>
+              <a:rPr lang="de-DE"/>
               <a:t>Dritte Ebene</a:t>
             </a:r>
           </a:p>
           <a:p>
             <a:pPr lvl="3"/>
             <a:r>
-              <a:rPr lang="de-DE" smtClean="0"/>
+              <a:rPr lang="de-DE"/>
               <a:t>Vierte Ebene</a:t>
             </a:r>
           </a:p>
           <a:p>
             <a:pPr lvl="4"/>
             <a:r>
-              <a:rPr lang="de-DE" smtClean="0"/>
+              <a:rPr lang="de-DE"/>
               <a:t>Fünfte Ebene</a:t>
             </a:r>
-            <a:endParaRPr lang="de-DE"/>
           </a:p>
         </p:txBody>
       </p:sp>
@@ -408,7 +419,7 @@
           <a:p>
             <a:fld id="{E6E54620-55E2-47CA-B387-7FC75089EF22}" type="datetimeFigureOut">
               <a:rPr lang="de-DE" smtClean="0"/>
-              <a:t>23.10.2015</a:t>
+              <a:t>16.03.2016</a:t>
             </a:fld>
             <a:endParaRPr lang="de-DE"/>
           </a:p>
@@ -507,10 +518,9 @@
           <a:lstStyle/>
           <a:p>
             <a:r>
-              <a:rPr lang="de-DE" smtClean="0"/>
+              <a:rPr lang="de-DE"/>
               <a:t>Titelmasterformat durch Klicken bearbeiten</a:t>
             </a:r>
-            <a:endParaRPr lang="de-DE"/>
           </a:p>
         </p:txBody>
       </p:sp>
@@ -536,38 +546,37 @@
           <a:p>
             <a:pPr lvl="0"/>
             <a:r>
-              <a:rPr lang="de-DE" smtClean="0"/>
+              <a:rPr lang="de-DE"/>
               <a:t>Textmasterformat bearbeiten</a:t>
             </a:r>
           </a:p>
           <a:p>
             <a:pPr lvl="1"/>
             <a:r>
-              <a:rPr lang="de-DE" smtClean="0"/>
+              <a:rPr lang="de-DE"/>
               <a:t>Zweite Ebene</a:t>
             </a:r>
           </a:p>
           <a:p>
             <a:pPr lvl="2"/>
             <a:r>
-              <a:rPr lang="de-DE" smtClean="0"/>
+              <a:rPr lang="de-DE"/>
               <a:t>Dritte Ebene</a:t>
             </a:r>
           </a:p>
           <a:p>
             <a:pPr lvl="3"/>
             <a:r>
-              <a:rPr lang="de-DE" smtClean="0"/>
+              <a:rPr lang="de-DE"/>
               <a:t>Vierte Ebene</a:t>
             </a:r>
           </a:p>
           <a:p>
             <a:pPr lvl="4"/>
             <a:r>
-              <a:rPr lang="de-DE" smtClean="0"/>
+              <a:rPr lang="de-DE"/>
               <a:t>Fünfte Ebene</a:t>
             </a:r>
-            <a:endParaRPr lang="de-DE"/>
           </a:p>
         </p:txBody>
       </p:sp>
@@ -588,7 +597,7 @@
           <a:p>
             <a:fld id="{E6E54620-55E2-47CA-B387-7FC75089EF22}" type="datetimeFigureOut">
               <a:rPr lang="de-DE" smtClean="0"/>
-              <a:t>23.10.2015</a:t>
+              <a:t>16.03.2016</a:t>
             </a:fld>
             <a:endParaRPr lang="de-DE"/>
           </a:p>
@@ -682,10 +691,9 @@
           <a:lstStyle/>
           <a:p>
             <a:r>
-              <a:rPr lang="de-DE" smtClean="0"/>
+              <a:rPr lang="de-DE"/>
               <a:t>Titelmasterformat durch Klicken bearbeiten</a:t>
             </a:r>
-            <a:endParaRPr lang="de-DE"/>
           </a:p>
         </p:txBody>
       </p:sp>
@@ -706,38 +714,37 @@
           <a:p>
             <a:pPr lvl="0"/>
             <a:r>
-              <a:rPr lang="de-DE" smtClean="0"/>
+              <a:rPr lang="de-DE"/>
               <a:t>Textmasterformat bearbeiten</a:t>
             </a:r>
           </a:p>
           <a:p>
             <a:pPr lvl="1"/>
             <a:r>
-              <a:rPr lang="de-DE" smtClean="0"/>
+              <a:rPr lang="de-DE"/>
               <a:t>Zweite Ebene</a:t>
             </a:r>
           </a:p>
           <a:p>
             <a:pPr lvl="2"/>
             <a:r>
-              <a:rPr lang="de-DE" smtClean="0"/>
+              <a:rPr lang="de-DE"/>
               <a:t>Dritte Ebene</a:t>
             </a:r>
           </a:p>
           <a:p>
             <a:pPr lvl="3"/>
             <a:r>
-              <a:rPr lang="de-DE" smtClean="0"/>
+              <a:rPr lang="de-DE"/>
               <a:t>Vierte Ebene</a:t>
             </a:r>
           </a:p>
           <a:p>
             <a:pPr lvl="4"/>
             <a:r>
-              <a:rPr lang="de-DE" smtClean="0"/>
+              <a:rPr lang="de-DE"/>
               <a:t>Fünfte Ebene</a:t>
             </a:r>
-            <a:endParaRPr lang="de-DE"/>
           </a:p>
         </p:txBody>
       </p:sp>
@@ -758,7 +765,7 @@
           <a:p>
             <a:fld id="{E6E54620-55E2-47CA-B387-7FC75089EF22}" type="datetimeFigureOut">
               <a:rPr lang="de-DE" smtClean="0"/>
-              <a:t>23.10.2015</a:t>
+              <a:t>16.03.2016</a:t>
             </a:fld>
             <a:endParaRPr lang="de-DE"/>
           </a:p>
@@ -861,10 +868,9 @@
           </a:lstStyle>
           <a:p>
             <a:r>
-              <a:rPr lang="de-DE" smtClean="0"/>
+              <a:rPr lang="de-DE"/>
               <a:t>Titelmasterformat durch Klicken bearbeiten</a:t>
             </a:r>
-            <a:endParaRPr lang="de-DE"/>
           </a:p>
         </p:txBody>
       </p:sp>
@@ -981,7 +987,7 @@
           <a:p>
             <a:pPr lvl="0"/>
             <a:r>
-              <a:rPr lang="de-DE" smtClean="0"/>
+              <a:rPr lang="de-DE"/>
               <a:t>Textmasterformat bearbeiten</a:t>
             </a:r>
           </a:p>
@@ -1004,7 +1010,7 @@
           <a:p>
             <a:fld id="{E6E54620-55E2-47CA-B387-7FC75089EF22}" type="datetimeFigureOut">
               <a:rPr lang="de-DE" smtClean="0"/>
-              <a:t>23.10.2015</a:t>
+              <a:t>16.03.2016</a:t>
             </a:fld>
             <a:endParaRPr lang="de-DE"/>
           </a:p>
@@ -1098,10 +1104,9 @@
           <a:lstStyle/>
           <a:p>
             <a:r>
-              <a:rPr lang="de-DE" smtClean="0"/>
+              <a:rPr lang="de-DE"/>
               <a:t>Titelmasterformat durch Klicken bearbeiten</a:t>
             </a:r>
-            <a:endParaRPr lang="de-DE"/>
           </a:p>
         </p:txBody>
       </p:sp>
@@ -1127,38 +1132,37 @@
           <a:p>
             <a:pPr lvl="0"/>
             <a:r>
-              <a:rPr lang="de-DE" smtClean="0"/>
+              <a:rPr lang="de-DE"/>
               <a:t>Textmasterformat bearbeiten</a:t>
             </a:r>
           </a:p>
           <a:p>
             <a:pPr lvl="1"/>
             <a:r>
-              <a:rPr lang="de-DE" smtClean="0"/>
+              <a:rPr lang="de-DE"/>
               <a:t>Zweite Ebene</a:t>
             </a:r>
           </a:p>
           <a:p>
             <a:pPr lvl="2"/>
             <a:r>
-              <a:rPr lang="de-DE" smtClean="0"/>
+              <a:rPr lang="de-DE"/>
               <a:t>Dritte Ebene</a:t>
             </a:r>
           </a:p>
           <a:p>
             <a:pPr lvl="3"/>
             <a:r>
-              <a:rPr lang="de-DE" smtClean="0"/>
+              <a:rPr lang="de-DE"/>
               <a:t>Vierte Ebene</a:t>
             </a:r>
           </a:p>
           <a:p>
             <a:pPr lvl="4"/>
             <a:r>
-              <a:rPr lang="de-DE" smtClean="0"/>
+              <a:rPr lang="de-DE"/>
               <a:t>Fünfte Ebene</a:t>
             </a:r>
-            <a:endParaRPr lang="de-DE"/>
           </a:p>
         </p:txBody>
       </p:sp>
@@ -1184,38 +1188,37 @@
           <a:p>
             <a:pPr lvl="0"/>
             <a:r>
-              <a:rPr lang="de-DE" smtClean="0"/>
+              <a:rPr lang="de-DE"/>
               <a:t>Textmasterformat bearbeiten</a:t>
             </a:r>
           </a:p>
           <a:p>
             <a:pPr lvl="1"/>
             <a:r>
-              <a:rPr lang="de-DE" smtClean="0"/>
+              <a:rPr lang="de-DE"/>
               <a:t>Zweite Ebene</a:t>
             </a:r>
           </a:p>
           <a:p>
             <a:pPr lvl="2"/>
             <a:r>
-              <a:rPr lang="de-DE" smtClean="0"/>
+              <a:rPr lang="de-DE"/>
               <a:t>Dritte Ebene</a:t>
             </a:r>
           </a:p>
           <a:p>
             <a:pPr lvl="3"/>
             <a:r>
-              <a:rPr lang="de-DE" smtClean="0"/>
+              <a:rPr lang="de-DE"/>
               <a:t>Vierte Ebene</a:t>
             </a:r>
           </a:p>
           <a:p>
             <a:pPr lvl="4"/>
             <a:r>
-              <a:rPr lang="de-DE" smtClean="0"/>
+              <a:rPr lang="de-DE"/>
               <a:t>Fünfte Ebene</a:t>
             </a:r>
-            <a:endParaRPr lang="de-DE"/>
           </a:p>
         </p:txBody>
       </p:sp>
@@ -1236,7 +1239,7 @@
           <a:p>
             <a:fld id="{E6E54620-55E2-47CA-B387-7FC75089EF22}" type="datetimeFigureOut">
               <a:rPr lang="de-DE" smtClean="0"/>
-              <a:t>23.10.2015</a:t>
+              <a:t>16.03.2016</a:t>
             </a:fld>
             <a:endParaRPr lang="de-DE"/>
           </a:p>
@@ -1335,10 +1338,9 @@
           <a:lstStyle/>
           <a:p>
             <a:r>
-              <a:rPr lang="de-DE" smtClean="0"/>
+              <a:rPr lang="de-DE"/>
               <a:t>Titelmasterformat durch Klicken bearbeiten</a:t>
             </a:r>
-            <a:endParaRPr lang="de-DE"/>
           </a:p>
         </p:txBody>
       </p:sp>
@@ -1401,7 +1403,7 @@
           <a:p>
             <a:pPr lvl="0"/>
             <a:r>
-              <a:rPr lang="de-DE" smtClean="0"/>
+              <a:rPr lang="de-DE"/>
               <a:t>Textmasterformat bearbeiten</a:t>
             </a:r>
           </a:p>
@@ -1429,38 +1431,37 @@
           <a:p>
             <a:pPr lvl="0"/>
             <a:r>
-              <a:rPr lang="de-DE" smtClean="0"/>
+              <a:rPr lang="de-DE"/>
               <a:t>Textmasterformat bearbeiten</a:t>
             </a:r>
           </a:p>
           <a:p>
             <a:pPr lvl="1"/>
             <a:r>
-              <a:rPr lang="de-DE" smtClean="0"/>
+              <a:rPr lang="de-DE"/>
               <a:t>Zweite Ebene</a:t>
             </a:r>
           </a:p>
           <a:p>
             <a:pPr lvl="2"/>
             <a:r>
-              <a:rPr lang="de-DE" smtClean="0"/>
+              <a:rPr lang="de-DE"/>
               <a:t>Dritte Ebene</a:t>
             </a:r>
           </a:p>
           <a:p>
             <a:pPr lvl="3"/>
             <a:r>
-              <a:rPr lang="de-DE" smtClean="0"/>
+              <a:rPr lang="de-DE"/>
               <a:t>Vierte Ebene</a:t>
             </a:r>
           </a:p>
           <a:p>
             <a:pPr lvl="4"/>
             <a:r>
-              <a:rPr lang="de-DE" smtClean="0"/>
+              <a:rPr lang="de-DE"/>
               <a:t>Fünfte Ebene</a:t>
             </a:r>
-            <a:endParaRPr lang="de-DE"/>
           </a:p>
         </p:txBody>
       </p:sp>
@@ -1523,7 +1524,7 @@
           <a:p>
             <a:pPr lvl="0"/>
             <a:r>
-              <a:rPr lang="de-DE" smtClean="0"/>
+              <a:rPr lang="de-DE"/>
               <a:t>Textmasterformat bearbeiten</a:t>
             </a:r>
           </a:p>
@@ -1551,38 +1552,37 @@
           <a:p>
             <a:pPr lvl="0"/>
             <a:r>
-              <a:rPr lang="de-DE" smtClean="0"/>
+              <a:rPr lang="de-DE"/>
               <a:t>Textmasterformat bearbeiten</a:t>
             </a:r>
           </a:p>
           <a:p>
             <a:pPr lvl="1"/>
             <a:r>
-              <a:rPr lang="de-DE" smtClean="0"/>
+              <a:rPr lang="de-DE"/>
               <a:t>Zweite Ebene</a:t>
             </a:r>
           </a:p>
           <a:p>
             <a:pPr lvl="2"/>
             <a:r>
-              <a:rPr lang="de-DE" smtClean="0"/>
+              <a:rPr lang="de-DE"/>
               <a:t>Dritte Ebene</a:t>
             </a:r>
           </a:p>
           <a:p>
             <a:pPr lvl="3"/>
             <a:r>
-              <a:rPr lang="de-DE" smtClean="0"/>
+              <a:rPr lang="de-DE"/>
               <a:t>Vierte Ebene</a:t>
             </a:r>
           </a:p>
           <a:p>
             <a:pPr lvl="4"/>
             <a:r>
-              <a:rPr lang="de-DE" smtClean="0"/>
+              <a:rPr lang="de-DE"/>
               <a:t>Fünfte Ebene</a:t>
             </a:r>
-            <a:endParaRPr lang="de-DE"/>
           </a:p>
         </p:txBody>
       </p:sp>
@@ -1603,7 +1603,7 @@
           <a:p>
             <a:fld id="{E6E54620-55E2-47CA-B387-7FC75089EF22}" type="datetimeFigureOut">
               <a:rPr lang="de-DE" smtClean="0"/>
-              <a:t>23.10.2015</a:t>
+              <a:t>16.03.2016</a:t>
             </a:fld>
             <a:endParaRPr lang="de-DE"/>
           </a:p>
@@ -1697,10 +1697,9 @@
           <a:lstStyle/>
           <a:p>
             <a:r>
-              <a:rPr lang="de-DE" smtClean="0"/>
+              <a:rPr lang="de-DE"/>
               <a:t>Titelmasterformat durch Klicken bearbeiten</a:t>
             </a:r>
-            <a:endParaRPr lang="de-DE"/>
           </a:p>
         </p:txBody>
       </p:sp>
@@ -1721,7 +1720,7 @@
           <a:p>
             <a:fld id="{E6E54620-55E2-47CA-B387-7FC75089EF22}" type="datetimeFigureOut">
               <a:rPr lang="de-DE" smtClean="0"/>
-              <a:t>23.10.2015</a:t>
+              <a:t>16.03.2016</a:t>
             </a:fld>
             <a:endParaRPr lang="de-DE"/>
           </a:p>
@@ -1816,7 +1815,7 @@
           <a:p>
             <a:fld id="{E6E54620-55E2-47CA-B387-7FC75089EF22}" type="datetimeFigureOut">
               <a:rPr lang="de-DE" smtClean="0"/>
-              <a:t>23.10.2015</a:t>
+              <a:t>16.03.2016</a:t>
             </a:fld>
             <a:endParaRPr lang="de-DE"/>
           </a:p>
@@ -1919,10 +1918,9 @@
           </a:lstStyle>
           <a:p>
             <a:r>
-              <a:rPr lang="de-DE" smtClean="0"/>
+              <a:rPr lang="de-DE"/>
               <a:t>Titelmasterformat durch Klicken bearbeiten</a:t>
             </a:r>
-            <a:endParaRPr lang="de-DE"/>
           </a:p>
         </p:txBody>
       </p:sp>
@@ -1976,38 +1974,37 @@
           <a:p>
             <a:pPr lvl="0"/>
             <a:r>
-              <a:rPr lang="de-DE" smtClean="0"/>
+              <a:rPr lang="de-DE"/>
               <a:t>Textmasterformat bearbeiten</a:t>
             </a:r>
           </a:p>
           <a:p>
             <a:pPr lvl="1"/>
             <a:r>
-              <a:rPr lang="de-DE" smtClean="0"/>
+              <a:rPr lang="de-DE"/>
               <a:t>Zweite Ebene</a:t>
             </a:r>
           </a:p>
           <a:p>
             <a:pPr lvl="2"/>
             <a:r>
-              <a:rPr lang="de-DE" smtClean="0"/>
+              <a:rPr lang="de-DE"/>
               <a:t>Dritte Ebene</a:t>
             </a:r>
           </a:p>
           <a:p>
             <a:pPr lvl="3"/>
             <a:r>
-              <a:rPr lang="de-DE" smtClean="0"/>
+              <a:rPr lang="de-DE"/>
               <a:t>Vierte Ebene</a:t>
             </a:r>
           </a:p>
           <a:p>
             <a:pPr lvl="4"/>
             <a:r>
-              <a:rPr lang="de-DE" smtClean="0"/>
+              <a:rPr lang="de-DE"/>
               <a:t>Fünfte Ebene</a:t>
             </a:r>
-            <a:endParaRPr lang="de-DE"/>
           </a:p>
         </p:txBody>
       </p:sp>
@@ -2070,7 +2067,7 @@
           <a:p>
             <a:pPr lvl="0"/>
             <a:r>
-              <a:rPr lang="de-DE" smtClean="0"/>
+              <a:rPr lang="de-DE"/>
               <a:t>Textmasterformat bearbeiten</a:t>
             </a:r>
           </a:p>
@@ -2093,7 +2090,7 @@
           <a:p>
             <a:fld id="{E6E54620-55E2-47CA-B387-7FC75089EF22}" type="datetimeFigureOut">
               <a:rPr lang="de-DE" smtClean="0"/>
-              <a:t>23.10.2015</a:t>
+              <a:t>16.03.2016</a:t>
             </a:fld>
             <a:endParaRPr lang="de-DE"/>
           </a:p>
@@ -2196,10 +2193,9 @@
           </a:lstStyle>
           <a:p>
             <a:r>
-              <a:rPr lang="de-DE" smtClean="0"/>
+              <a:rPr lang="de-DE"/>
               <a:t>Titelmasterformat durch Klicken bearbeiten</a:t>
             </a:r>
-            <a:endParaRPr lang="de-DE"/>
           </a:p>
         </p:txBody>
       </p:sp>
@@ -2323,7 +2319,7 @@
           <a:p>
             <a:pPr lvl="0"/>
             <a:r>
-              <a:rPr lang="de-DE" smtClean="0"/>
+              <a:rPr lang="de-DE"/>
               <a:t>Textmasterformat bearbeiten</a:t>
             </a:r>
           </a:p>
@@ -2346,7 +2342,7 @@
           <a:p>
             <a:fld id="{E6E54620-55E2-47CA-B387-7FC75089EF22}" type="datetimeFigureOut">
               <a:rPr lang="de-DE" smtClean="0"/>
-              <a:t>23.10.2015</a:t>
+              <a:t>16.03.2016</a:t>
             </a:fld>
             <a:endParaRPr lang="de-DE"/>
           </a:p>
@@ -2455,10 +2451,9 @@
           <a:lstStyle/>
           <a:p>
             <a:r>
-              <a:rPr lang="de-DE" smtClean="0"/>
+              <a:rPr lang="de-DE"/>
               <a:t>Titelmasterformat durch Klicken bearbeiten</a:t>
             </a:r>
-            <a:endParaRPr lang="de-DE"/>
           </a:p>
         </p:txBody>
       </p:sp>
@@ -2489,38 +2484,37 @@
           <a:p>
             <a:pPr lvl="0"/>
             <a:r>
-              <a:rPr lang="de-DE" smtClean="0"/>
+              <a:rPr lang="de-DE"/>
               <a:t>Textmasterformat bearbeiten</a:t>
             </a:r>
           </a:p>
           <a:p>
             <a:pPr lvl="1"/>
             <a:r>
-              <a:rPr lang="de-DE" smtClean="0"/>
+              <a:rPr lang="de-DE"/>
               <a:t>Zweite Ebene</a:t>
             </a:r>
           </a:p>
           <a:p>
             <a:pPr lvl="2"/>
             <a:r>
-              <a:rPr lang="de-DE" smtClean="0"/>
+              <a:rPr lang="de-DE"/>
               <a:t>Dritte Ebene</a:t>
             </a:r>
           </a:p>
           <a:p>
             <a:pPr lvl="3"/>
             <a:r>
-              <a:rPr lang="de-DE" smtClean="0"/>
+              <a:rPr lang="de-DE"/>
               <a:t>Vierte Ebene</a:t>
             </a:r>
           </a:p>
           <a:p>
             <a:pPr lvl="4"/>
             <a:r>
-              <a:rPr lang="de-DE" smtClean="0"/>
+              <a:rPr lang="de-DE"/>
               <a:t>Fünfte Ebene</a:t>
             </a:r>
-            <a:endParaRPr lang="de-DE"/>
           </a:p>
         </p:txBody>
       </p:sp>
@@ -2559,7 +2553,7 @@
           <a:p>
             <a:fld id="{E6E54620-55E2-47CA-B387-7FC75089EF22}" type="datetimeFigureOut">
               <a:rPr lang="de-DE" smtClean="0"/>
-              <a:t>23.10.2015</a:t>
+              <a:t>16.03.2016</a:t>
             </a:fld>
             <a:endParaRPr lang="de-DE"/>
           </a:p>
@@ -2966,7 +2960,7 @@
       </p:grpSpPr>
       <p:pic>
         <p:nvPicPr>
-          <p:cNvPr id="6" name="Grafik 5"/>
+          <p:cNvPr id="2" name="Grafik 1"/>
           <p:cNvPicPr>
             <a:picLocks noChangeAspect="1"/>
           </p:cNvPicPr>
@@ -2986,22 +2980,12 @@
         </p:blipFill>
         <p:spPr>
           <a:xfrm>
-            <a:off x="1524000" y="1019674"/>
-            <a:ext cx="9144000" cy="4818653"/>
+            <a:off x="0" y="1479306"/>
+            <a:ext cx="12192000" cy="3899388"/>
           </a:xfrm>
           <a:prstGeom prst="rect">
             <a:avLst/>
           </a:prstGeom>
-          <a:ln>
-            <a:noFill/>
-          </a:ln>
-          <a:effectLst>
-            <a:outerShdw blurRad="292100" dist="139700" dir="2700000" algn="tl" rotWithShape="0">
-              <a:srgbClr val="333333">
-                <a:alpha val="65000"/>
-              </a:srgbClr>
-            </a:outerShdw>
-          </a:effectLst>
         </p:spPr>
       </p:pic>
     </p:spTree>
@@ -3014,13 +2998,666 @@
   <p:clrMapOvr>
     <a:masterClrMapping/>
   </p:clrMapOvr>
-  <p:timing>
-    <p:tnLst>
-      <p:par>
-        <p:cTn id="1" dur="indefinite" restart="never" nodeType="tmRoot"/>
-      </p:par>
-    </p:tnLst>
-  </p:timing>
+</p:sld>
+</file>
+
+<file path=ppt/slides/slide10.xml><?xml version="1.0" encoding="utf-8"?>
+<p:sld xmlns:a="http://schemas.openxmlformats.org/drawingml/2006/main" xmlns:r="http://schemas.openxmlformats.org/officeDocument/2006/relationships" xmlns:p="http://schemas.openxmlformats.org/presentationml/2006/main">
+  <p:cSld>
+    <p:spTree>
+      <p:nvGrpSpPr>
+        <p:cNvPr id="1" name=""/>
+        <p:cNvGrpSpPr/>
+        <p:nvPr/>
+      </p:nvGrpSpPr>
+      <p:grpSpPr>
+        <a:xfrm>
+          <a:off x="0" y="0"/>
+          <a:ext cx="0" cy="0"/>
+          <a:chOff x="0" y="0"/>
+          <a:chExt cx="0" cy="0"/>
+        </a:xfrm>
+      </p:grpSpPr>
+      <p:pic>
+        <p:nvPicPr>
+          <p:cNvPr id="2" name="Grafik 1"/>
+          <p:cNvPicPr>
+            <a:picLocks noChangeAspect="1"/>
+          </p:cNvPicPr>
+          <p:nvPr/>
+        </p:nvPicPr>
+        <p:blipFill>
+          <a:blip r:embed="rId2">
+            <a:extLst>
+              <a:ext uri="{28A0092B-C50C-407E-A947-70E740481C1C}">
+                <a14:useLocalDpi xmlns:a14="http://schemas.microsoft.com/office/drawing/2010/main" val="0"/>
+              </a:ext>
+            </a:extLst>
+          </a:blip>
+          <a:stretch>
+            <a:fillRect/>
+          </a:stretch>
+        </p:blipFill>
+        <p:spPr>
+          <a:xfrm>
+            <a:off x="3442917" y="599680"/>
+            <a:ext cx="5306165" cy="5658640"/>
+          </a:xfrm>
+          <a:prstGeom prst="rect">
+            <a:avLst/>
+          </a:prstGeom>
+        </p:spPr>
+      </p:pic>
+    </p:spTree>
+    <p:extLst>
+      <p:ext uri="{BB962C8B-B14F-4D97-AF65-F5344CB8AC3E}">
+        <p14:creationId xmlns:p14="http://schemas.microsoft.com/office/powerpoint/2010/main" val="3575073329"/>
+      </p:ext>
+    </p:extLst>
+  </p:cSld>
+  <p:clrMapOvr>
+    <a:masterClrMapping/>
+  </p:clrMapOvr>
+</p:sld>
+</file>
+
+<file path=ppt/slides/slide11.xml><?xml version="1.0" encoding="utf-8"?>
+<p:sld xmlns:a="http://schemas.openxmlformats.org/drawingml/2006/main" xmlns:r="http://schemas.openxmlformats.org/officeDocument/2006/relationships" xmlns:p="http://schemas.openxmlformats.org/presentationml/2006/main">
+  <p:cSld>
+    <p:spTree>
+      <p:nvGrpSpPr>
+        <p:cNvPr id="1" name=""/>
+        <p:cNvGrpSpPr/>
+        <p:nvPr/>
+      </p:nvGrpSpPr>
+      <p:grpSpPr>
+        <a:xfrm>
+          <a:off x="0" y="0"/>
+          <a:ext cx="0" cy="0"/>
+          <a:chOff x="0" y="0"/>
+          <a:chExt cx="0" cy="0"/>
+        </a:xfrm>
+      </p:grpSpPr>
+      <p:pic>
+        <p:nvPicPr>
+          <p:cNvPr id="2" name="Grafik 1"/>
+          <p:cNvPicPr>
+            <a:picLocks noChangeAspect="1"/>
+          </p:cNvPicPr>
+          <p:nvPr/>
+        </p:nvPicPr>
+        <p:blipFill>
+          <a:blip r:embed="rId2">
+            <a:extLst>
+              <a:ext uri="{28A0092B-C50C-407E-A947-70E740481C1C}">
+                <a14:useLocalDpi xmlns:a14="http://schemas.microsoft.com/office/drawing/2010/main" val="0"/>
+              </a:ext>
+            </a:extLst>
+          </a:blip>
+          <a:stretch>
+            <a:fillRect/>
+          </a:stretch>
+        </p:blipFill>
+        <p:spPr>
+          <a:xfrm>
+            <a:off x="426445" y="0"/>
+            <a:ext cx="11339110" cy="6858000"/>
+          </a:xfrm>
+          <a:prstGeom prst="rect">
+            <a:avLst/>
+          </a:prstGeom>
+        </p:spPr>
+      </p:pic>
+    </p:spTree>
+    <p:extLst>
+      <p:ext uri="{BB962C8B-B14F-4D97-AF65-F5344CB8AC3E}">
+        <p14:creationId xmlns:p14="http://schemas.microsoft.com/office/powerpoint/2010/main" val="3336749841"/>
+      </p:ext>
+    </p:extLst>
+  </p:cSld>
+  <p:clrMapOvr>
+    <a:masterClrMapping/>
+  </p:clrMapOvr>
+</p:sld>
+</file>
+
+<file path=ppt/slides/slide2.xml><?xml version="1.0" encoding="utf-8"?>
+<p:sld xmlns:a="http://schemas.openxmlformats.org/drawingml/2006/main" xmlns:r="http://schemas.openxmlformats.org/officeDocument/2006/relationships" xmlns:p="http://schemas.openxmlformats.org/presentationml/2006/main">
+  <p:cSld>
+    <p:spTree>
+      <p:nvGrpSpPr>
+        <p:cNvPr id="1" name=""/>
+        <p:cNvGrpSpPr/>
+        <p:nvPr/>
+      </p:nvGrpSpPr>
+      <p:grpSpPr>
+        <a:xfrm>
+          <a:off x="0" y="0"/>
+          <a:ext cx="0" cy="0"/>
+          <a:chOff x="0" y="0"/>
+          <a:chExt cx="0" cy="0"/>
+        </a:xfrm>
+      </p:grpSpPr>
+      <p:pic>
+        <p:nvPicPr>
+          <p:cNvPr id="2" name="Grafik 1"/>
+          <p:cNvPicPr>
+            <a:picLocks noChangeAspect="1"/>
+          </p:cNvPicPr>
+          <p:nvPr/>
+        </p:nvPicPr>
+        <p:blipFill>
+          <a:blip r:embed="rId2">
+            <a:extLst>
+              <a:ext uri="{28A0092B-C50C-407E-A947-70E740481C1C}">
+                <a14:useLocalDpi xmlns:a14="http://schemas.microsoft.com/office/drawing/2010/main" val="0"/>
+              </a:ext>
+            </a:extLst>
+          </a:blip>
+          <a:stretch>
+            <a:fillRect/>
+          </a:stretch>
+        </p:blipFill>
+        <p:spPr>
+          <a:xfrm>
+            <a:off x="3442917" y="756864"/>
+            <a:ext cx="5306165" cy="5344271"/>
+          </a:xfrm>
+          <a:prstGeom prst="rect">
+            <a:avLst/>
+          </a:prstGeom>
+        </p:spPr>
+      </p:pic>
+    </p:spTree>
+    <p:extLst>
+      <p:ext uri="{BB962C8B-B14F-4D97-AF65-F5344CB8AC3E}">
+        <p14:creationId xmlns:p14="http://schemas.microsoft.com/office/powerpoint/2010/main" val="2382584226"/>
+      </p:ext>
+    </p:extLst>
+  </p:cSld>
+  <p:clrMapOvr>
+    <a:masterClrMapping/>
+  </p:clrMapOvr>
+</p:sld>
+</file>
+
+<file path=ppt/slides/slide3.xml><?xml version="1.0" encoding="utf-8"?>
+<p:sld xmlns:a="http://schemas.openxmlformats.org/drawingml/2006/main" xmlns:r="http://schemas.openxmlformats.org/officeDocument/2006/relationships" xmlns:p="http://schemas.openxmlformats.org/presentationml/2006/main">
+  <p:cSld>
+    <p:spTree>
+      <p:nvGrpSpPr>
+        <p:cNvPr id="1" name=""/>
+        <p:cNvGrpSpPr/>
+        <p:nvPr/>
+      </p:nvGrpSpPr>
+      <p:grpSpPr>
+        <a:xfrm>
+          <a:off x="0" y="0"/>
+          <a:ext cx="0" cy="0"/>
+          <a:chOff x="0" y="0"/>
+          <a:chExt cx="0" cy="0"/>
+        </a:xfrm>
+      </p:grpSpPr>
+      <p:pic>
+        <p:nvPicPr>
+          <p:cNvPr id="2" name="Grafik 1"/>
+          <p:cNvPicPr>
+            <a:picLocks noChangeAspect="1"/>
+          </p:cNvPicPr>
+          <p:nvPr/>
+        </p:nvPicPr>
+        <p:blipFill>
+          <a:blip r:embed="rId2">
+            <a:extLst>
+              <a:ext uri="{28A0092B-C50C-407E-A947-70E740481C1C}">
+                <a14:useLocalDpi xmlns:a14="http://schemas.microsoft.com/office/drawing/2010/main" val="0"/>
+              </a:ext>
+            </a:extLst>
+          </a:blip>
+          <a:stretch>
+            <a:fillRect/>
+          </a:stretch>
+        </p:blipFill>
+        <p:spPr>
+          <a:xfrm>
+            <a:off x="0" y="966233"/>
+            <a:ext cx="12192000" cy="4925533"/>
+          </a:xfrm>
+          <a:prstGeom prst="rect">
+            <a:avLst/>
+          </a:prstGeom>
+        </p:spPr>
+      </p:pic>
+    </p:spTree>
+    <p:extLst>
+      <p:ext uri="{BB962C8B-B14F-4D97-AF65-F5344CB8AC3E}">
+        <p14:creationId xmlns:p14="http://schemas.microsoft.com/office/powerpoint/2010/main" val="1650095365"/>
+      </p:ext>
+    </p:extLst>
+  </p:cSld>
+  <p:clrMapOvr>
+    <a:masterClrMapping/>
+  </p:clrMapOvr>
+</p:sld>
+</file>
+
+<file path=ppt/slides/slide4.xml><?xml version="1.0" encoding="utf-8"?>
+<p:sld xmlns:a="http://schemas.openxmlformats.org/drawingml/2006/main" xmlns:r="http://schemas.openxmlformats.org/officeDocument/2006/relationships" xmlns:p="http://schemas.openxmlformats.org/presentationml/2006/main">
+  <p:cSld>
+    <p:spTree>
+      <p:nvGrpSpPr>
+        <p:cNvPr id="1" name=""/>
+        <p:cNvGrpSpPr/>
+        <p:nvPr/>
+      </p:nvGrpSpPr>
+      <p:grpSpPr>
+        <a:xfrm>
+          <a:off x="0" y="0"/>
+          <a:ext cx="0" cy="0"/>
+          <a:chOff x="0" y="0"/>
+          <a:chExt cx="0" cy="0"/>
+        </a:xfrm>
+      </p:grpSpPr>
+      <p:pic>
+        <p:nvPicPr>
+          <p:cNvPr id="2" name="Grafik 1"/>
+          <p:cNvPicPr>
+            <a:picLocks noChangeAspect="1"/>
+          </p:cNvPicPr>
+          <p:nvPr/>
+        </p:nvPicPr>
+        <p:blipFill>
+          <a:blip r:embed="rId2">
+            <a:extLst>
+              <a:ext uri="{28A0092B-C50C-407E-A947-70E740481C1C}">
+                <a14:useLocalDpi xmlns:a14="http://schemas.microsoft.com/office/drawing/2010/main" val="0"/>
+              </a:ext>
+            </a:extLst>
+          </a:blip>
+          <a:stretch>
+            <a:fillRect/>
+          </a:stretch>
+        </p:blipFill>
+        <p:spPr>
+          <a:xfrm>
+            <a:off x="3442917" y="756864"/>
+            <a:ext cx="5306165" cy="5344271"/>
+          </a:xfrm>
+          <a:prstGeom prst="rect">
+            <a:avLst/>
+          </a:prstGeom>
+        </p:spPr>
+      </p:pic>
+    </p:spTree>
+    <p:extLst>
+      <p:ext uri="{BB962C8B-B14F-4D97-AF65-F5344CB8AC3E}">
+        <p14:creationId xmlns:p14="http://schemas.microsoft.com/office/powerpoint/2010/main" val="266778867"/>
+      </p:ext>
+    </p:extLst>
+  </p:cSld>
+  <p:clrMapOvr>
+    <a:masterClrMapping/>
+  </p:clrMapOvr>
+</p:sld>
+</file>
+
+<file path=ppt/slides/slide5.xml><?xml version="1.0" encoding="utf-8"?>
+<p:sld xmlns:a="http://schemas.openxmlformats.org/drawingml/2006/main" xmlns:r="http://schemas.openxmlformats.org/officeDocument/2006/relationships" xmlns:p="http://schemas.openxmlformats.org/presentationml/2006/main">
+  <p:cSld>
+    <p:spTree>
+      <p:nvGrpSpPr>
+        <p:cNvPr id="1" name=""/>
+        <p:cNvGrpSpPr/>
+        <p:nvPr/>
+      </p:nvGrpSpPr>
+      <p:grpSpPr>
+        <a:xfrm>
+          <a:off x="0" y="0"/>
+          <a:ext cx="0" cy="0"/>
+          <a:chOff x="0" y="0"/>
+          <a:chExt cx="0" cy="0"/>
+        </a:xfrm>
+      </p:grpSpPr>
+      <p:pic>
+        <p:nvPicPr>
+          <p:cNvPr id="2" name="Grafik 1"/>
+          <p:cNvPicPr>
+            <a:picLocks noChangeAspect="1"/>
+          </p:cNvPicPr>
+          <p:nvPr/>
+        </p:nvPicPr>
+        <p:blipFill>
+          <a:blip r:embed="rId2">
+            <a:extLst>
+              <a:ext uri="{28A0092B-C50C-407E-A947-70E740481C1C}">
+                <a14:useLocalDpi xmlns:a14="http://schemas.microsoft.com/office/drawing/2010/main" val="0"/>
+              </a:ext>
+            </a:extLst>
+          </a:blip>
+          <a:stretch>
+            <a:fillRect/>
+          </a:stretch>
+        </p:blipFill>
+        <p:spPr>
+          <a:xfrm>
+            <a:off x="3447680" y="699706"/>
+            <a:ext cx="5296639" cy="5458587"/>
+          </a:xfrm>
+          <a:prstGeom prst="rect">
+            <a:avLst/>
+          </a:prstGeom>
+        </p:spPr>
+      </p:pic>
+    </p:spTree>
+    <p:extLst>
+      <p:ext uri="{BB962C8B-B14F-4D97-AF65-F5344CB8AC3E}">
+        <p14:creationId xmlns:p14="http://schemas.microsoft.com/office/powerpoint/2010/main" val="233917531"/>
+      </p:ext>
+    </p:extLst>
+  </p:cSld>
+  <p:clrMapOvr>
+    <a:masterClrMapping/>
+  </p:clrMapOvr>
+</p:sld>
+</file>
+
+<file path=ppt/slides/slide6.xml><?xml version="1.0" encoding="utf-8"?>
+<p:sld xmlns:a="http://schemas.openxmlformats.org/drawingml/2006/main" xmlns:r="http://schemas.openxmlformats.org/officeDocument/2006/relationships" xmlns:p="http://schemas.openxmlformats.org/presentationml/2006/main">
+  <p:cSld>
+    <p:spTree>
+      <p:nvGrpSpPr>
+        <p:cNvPr id="1" name=""/>
+        <p:cNvGrpSpPr/>
+        <p:nvPr/>
+      </p:nvGrpSpPr>
+      <p:grpSpPr>
+        <a:xfrm>
+          <a:off x="0" y="0"/>
+          <a:ext cx="0" cy="0"/>
+          <a:chOff x="0" y="0"/>
+          <a:chExt cx="0" cy="0"/>
+        </a:xfrm>
+      </p:grpSpPr>
+      <p:pic>
+        <p:nvPicPr>
+          <p:cNvPr id="2" name="Grafik 1"/>
+          <p:cNvPicPr>
+            <a:picLocks noChangeAspect="1"/>
+          </p:cNvPicPr>
+          <p:nvPr/>
+        </p:nvPicPr>
+        <p:blipFill>
+          <a:blip r:embed="rId2">
+            <a:extLst>
+              <a:ext uri="{28A0092B-C50C-407E-A947-70E740481C1C}">
+                <a14:useLocalDpi xmlns:a14="http://schemas.microsoft.com/office/drawing/2010/main" val="0"/>
+              </a:ext>
+            </a:extLst>
+          </a:blip>
+          <a:stretch>
+            <a:fillRect/>
+          </a:stretch>
+        </p:blipFill>
+        <p:spPr>
+          <a:xfrm>
+            <a:off x="0" y="649327"/>
+            <a:ext cx="12192000" cy="5559346"/>
+          </a:xfrm>
+          <a:prstGeom prst="rect">
+            <a:avLst/>
+          </a:prstGeom>
+        </p:spPr>
+      </p:pic>
+      <p:pic>
+        <p:nvPicPr>
+          <p:cNvPr id="3" name="Grafik 2"/>
+          <p:cNvPicPr>
+            <a:picLocks noChangeAspect="1"/>
+          </p:cNvPicPr>
+          <p:nvPr/>
+        </p:nvPicPr>
+        <p:blipFill>
+          <a:blip r:embed="rId3">
+            <a:extLst>
+              <a:ext uri="{28A0092B-C50C-407E-A947-70E740481C1C}">
+                <a14:useLocalDpi xmlns:a14="http://schemas.microsoft.com/office/drawing/2010/main" val="0"/>
+              </a:ext>
+            </a:extLst>
+          </a:blip>
+          <a:stretch>
+            <a:fillRect/>
+          </a:stretch>
+        </p:blipFill>
+        <p:spPr>
+          <a:xfrm>
+            <a:off x="3091935" y="3429000"/>
+            <a:ext cx="5306165" cy="2514951"/>
+          </a:xfrm>
+          <a:prstGeom prst="rect">
+            <a:avLst/>
+          </a:prstGeom>
+          <a:solidFill>
+            <a:srgbClr val="FFFFFF">
+              <a:shade val="85000"/>
+            </a:srgbClr>
+          </a:solidFill>
+          <a:ln w="88900" cap="sq">
+            <a:solidFill>
+              <a:srgbClr val="FFFFFF"/>
+            </a:solidFill>
+            <a:miter lim="800000"/>
+          </a:ln>
+          <a:effectLst>
+            <a:outerShdw blurRad="55000" dist="18000" dir="5400000" algn="tl" rotWithShape="0">
+              <a:srgbClr val="000000">
+                <a:alpha val="40000"/>
+              </a:srgbClr>
+            </a:outerShdw>
+          </a:effectLst>
+          <a:scene3d>
+            <a:camera prst="orthographicFront"/>
+            <a:lightRig rig="twoPt" dir="t">
+              <a:rot lat="0" lon="0" rev="7200000"/>
+            </a:lightRig>
+          </a:scene3d>
+          <a:sp3d>
+            <a:bevelT w="25400" h="19050"/>
+            <a:contourClr>
+              <a:srgbClr val="FFFFFF"/>
+            </a:contourClr>
+          </a:sp3d>
+        </p:spPr>
+      </p:pic>
+    </p:spTree>
+    <p:extLst>
+      <p:ext uri="{BB962C8B-B14F-4D97-AF65-F5344CB8AC3E}">
+        <p14:creationId xmlns:p14="http://schemas.microsoft.com/office/powerpoint/2010/main" val="3373224270"/>
+      </p:ext>
+    </p:extLst>
+  </p:cSld>
+  <p:clrMapOvr>
+    <a:masterClrMapping/>
+  </p:clrMapOvr>
+</p:sld>
+</file>
+
+<file path=ppt/slides/slide7.xml><?xml version="1.0" encoding="utf-8"?>
+<p:sld xmlns:a="http://schemas.openxmlformats.org/drawingml/2006/main" xmlns:r="http://schemas.openxmlformats.org/officeDocument/2006/relationships" xmlns:p="http://schemas.openxmlformats.org/presentationml/2006/main">
+  <p:cSld>
+    <p:spTree>
+      <p:nvGrpSpPr>
+        <p:cNvPr id="1" name=""/>
+        <p:cNvGrpSpPr/>
+        <p:nvPr/>
+      </p:nvGrpSpPr>
+      <p:grpSpPr>
+        <a:xfrm>
+          <a:off x="0" y="0"/>
+          <a:ext cx="0" cy="0"/>
+          <a:chOff x="0" y="0"/>
+          <a:chExt cx="0" cy="0"/>
+        </a:xfrm>
+      </p:grpSpPr>
+      <p:pic>
+        <p:nvPicPr>
+          <p:cNvPr id="2" name="Grafik 1"/>
+          <p:cNvPicPr>
+            <a:picLocks noChangeAspect="1"/>
+          </p:cNvPicPr>
+          <p:nvPr/>
+        </p:nvPicPr>
+        <p:blipFill>
+          <a:blip r:embed="rId2">
+            <a:extLst>
+              <a:ext uri="{28A0092B-C50C-407E-A947-70E740481C1C}">
+                <a14:useLocalDpi xmlns:a14="http://schemas.microsoft.com/office/drawing/2010/main" val="0"/>
+              </a:ext>
+            </a:extLst>
+          </a:blip>
+          <a:stretch>
+            <a:fillRect/>
+          </a:stretch>
+        </p:blipFill>
+        <p:spPr>
+          <a:xfrm>
+            <a:off x="3442917" y="880707"/>
+            <a:ext cx="5306165" cy="5096586"/>
+          </a:xfrm>
+          <a:prstGeom prst="rect">
+            <a:avLst/>
+          </a:prstGeom>
+        </p:spPr>
+      </p:pic>
+    </p:spTree>
+    <p:extLst>
+      <p:ext uri="{BB962C8B-B14F-4D97-AF65-F5344CB8AC3E}">
+        <p14:creationId xmlns:p14="http://schemas.microsoft.com/office/powerpoint/2010/main" val="1536246838"/>
+      </p:ext>
+    </p:extLst>
+  </p:cSld>
+  <p:clrMapOvr>
+    <a:masterClrMapping/>
+  </p:clrMapOvr>
+</p:sld>
+</file>
+
+<file path=ppt/slides/slide8.xml><?xml version="1.0" encoding="utf-8"?>
+<p:sld xmlns:a="http://schemas.openxmlformats.org/drawingml/2006/main" xmlns:r="http://schemas.openxmlformats.org/officeDocument/2006/relationships" xmlns:p="http://schemas.openxmlformats.org/presentationml/2006/main">
+  <p:cSld>
+    <p:spTree>
+      <p:nvGrpSpPr>
+        <p:cNvPr id="1" name=""/>
+        <p:cNvGrpSpPr/>
+        <p:nvPr/>
+      </p:nvGrpSpPr>
+      <p:grpSpPr>
+        <a:xfrm>
+          <a:off x="0" y="0"/>
+          <a:ext cx="0" cy="0"/>
+          <a:chOff x="0" y="0"/>
+          <a:chExt cx="0" cy="0"/>
+        </a:xfrm>
+      </p:grpSpPr>
+      <p:pic>
+        <p:nvPicPr>
+          <p:cNvPr id="2" name="Grafik 1"/>
+          <p:cNvPicPr>
+            <a:picLocks noChangeAspect="1"/>
+          </p:cNvPicPr>
+          <p:nvPr/>
+        </p:nvPicPr>
+        <p:blipFill>
+          <a:blip r:embed="rId2">
+            <a:extLst>
+              <a:ext uri="{28A0092B-C50C-407E-A947-70E740481C1C}">
+                <a14:useLocalDpi xmlns:a14="http://schemas.microsoft.com/office/drawing/2010/main" val="0"/>
+              </a:ext>
+            </a:extLst>
+          </a:blip>
+          <a:stretch>
+            <a:fillRect/>
+          </a:stretch>
+        </p:blipFill>
+        <p:spPr>
+          <a:xfrm>
+            <a:off x="3442917" y="1128391"/>
+            <a:ext cx="5306165" cy="4601217"/>
+          </a:xfrm>
+          <a:prstGeom prst="rect">
+            <a:avLst/>
+          </a:prstGeom>
+        </p:spPr>
+      </p:pic>
+    </p:spTree>
+    <p:extLst>
+      <p:ext uri="{BB962C8B-B14F-4D97-AF65-F5344CB8AC3E}">
+        <p14:creationId xmlns:p14="http://schemas.microsoft.com/office/powerpoint/2010/main" val="537589012"/>
+      </p:ext>
+    </p:extLst>
+  </p:cSld>
+  <p:clrMapOvr>
+    <a:masterClrMapping/>
+  </p:clrMapOvr>
+</p:sld>
+</file>
+
+<file path=ppt/slides/slide9.xml><?xml version="1.0" encoding="utf-8"?>
+<p:sld xmlns:a="http://schemas.openxmlformats.org/drawingml/2006/main" xmlns:r="http://schemas.openxmlformats.org/officeDocument/2006/relationships" xmlns:p="http://schemas.openxmlformats.org/presentationml/2006/main">
+  <p:cSld>
+    <p:spTree>
+      <p:nvGrpSpPr>
+        <p:cNvPr id="1" name=""/>
+        <p:cNvGrpSpPr/>
+        <p:nvPr/>
+      </p:nvGrpSpPr>
+      <p:grpSpPr>
+        <a:xfrm>
+          <a:off x="0" y="0"/>
+          <a:ext cx="0" cy="0"/>
+          <a:chOff x="0" y="0"/>
+          <a:chExt cx="0" cy="0"/>
+        </a:xfrm>
+      </p:grpSpPr>
+      <p:pic>
+        <p:nvPicPr>
+          <p:cNvPr id="2" name="Grafik 1"/>
+          <p:cNvPicPr>
+            <a:picLocks noChangeAspect="1"/>
+          </p:cNvPicPr>
+          <p:nvPr/>
+        </p:nvPicPr>
+        <p:blipFill>
+          <a:blip r:embed="rId2">
+            <a:extLst>
+              <a:ext uri="{28A0092B-C50C-407E-A947-70E740481C1C}">
+                <a14:useLocalDpi xmlns:a14="http://schemas.microsoft.com/office/drawing/2010/main" val="0"/>
+              </a:ext>
+            </a:extLst>
+          </a:blip>
+          <a:stretch>
+            <a:fillRect/>
+          </a:stretch>
+        </p:blipFill>
+        <p:spPr>
+          <a:xfrm>
+            <a:off x="3442917" y="494890"/>
+            <a:ext cx="5306165" cy="5868219"/>
+          </a:xfrm>
+          <a:prstGeom prst="rect">
+            <a:avLst/>
+          </a:prstGeom>
+        </p:spPr>
+      </p:pic>
+    </p:spTree>
+    <p:extLst>
+      <p:ext uri="{BB962C8B-B14F-4D97-AF65-F5344CB8AC3E}">
+        <p14:creationId xmlns:p14="http://schemas.microsoft.com/office/powerpoint/2010/main" val="1236471911"/>
+      </p:ext>
+    </p:extLst>
+  </p:cSld>
+  <p:clrMapOvr>
+    <a:masterClrMapping/>
+  </p:clrMapOvr>
 </p:sld>
 </file>
 

</xml_diff>